<commit_message>
Things are in place. Things are good. Only need to add final boss
</commit_message>
<xml_diff>
--- a/Assets/Title screen and tutrorial.pptx
+++ b/Assets/Title screen and tutrorial.pptx
@@ -7,6 +7,8 @@
   <p:sldIdLst>
     <p:sldId id="256" r:id="rId2"/>
     <p:sldId id="257" r:id="rId3"/>
+    <p:sldId id="258" r:id="rId4"/>
+    <p:sldId id="259" r:id="rId5"/>
   </p:sldIdLst>
   <p:sldSz cx="5486400" cy="7315200" type="B5JIS"/>
   <p:notesSz cx="6858000" cy="9144000"/>
@@ -244,7 +246,7 @@
           <a:p>
             <a:fld id="{019A4621-3A5A-461F-B391-01560BCA82BB}" type="datetimeFigureOut">
               <a:rPr lang="en-GB" smtClean="0"/>
-              <a:t>19/04/2019</a:t>
+              <a:t>21/04/2019</a:t>
             </a:fld>
             <a:endParaRPr lang="en-GB"/>
           </a:p>
@@ -414,7 +416,7 @@
           <a:p>
             <a:fld id="{019A4621-3A5A-461F-B391-01560BCA82BB}" type="datetimeFigureOut">
               <a:rPr lang="en-GB" smtClean="0"/>
-              <a:t>19/04/2019</a:t>
+              <a:t>21/04/2019</a:t>
             </a:fld>
             <a:endParaRPr lang="en-GB"/>
           </a:p>
@@ -594,7 +596,7 @@
           <a:p>
             <a:fld id="{019A4621-3A5A-461F-B391-01560BCA82BB}" type="datetimeFigureOut">
               <a:rPr lang="en-GB" smtClean="0"/>
-              <a:t>19/04/2019</a:t>
+              <a:t>21/04/2019</a:t>
             </a:fld>
             <a:endParaRPr lang="en-GB"/>
           </a:p>
@@ -764,7 +766,7 @@
           <a:p>
             <a:fld id="{019A4621-3A5A-461F-B391-01560BCA82BB}" type="datetimeFigureOut">
               <a:rPr lang="en-GB" smtClean="0"/>
-              <a:t>19/04/2019</a:t>
+              <a:t>21/04/2019</a:t>
             </a:fld>
             <a:endParaRPr lang="en-GB"/>
           </a:p>
@@ -1008,7 +1010,7 @@
           <a:p>
             <a:fld id="{019A4621-3A5A-461F-B391-01560BCA82BB}" type="datetimeFigureOut">
               <a:rPr lang="en-GB" smtClean="0"/>
-              <a:t>19/04/2019</a:t>
+              <a:t>21/04/2019</a:t>
             </a:fld>
             <a:endParaRPr lang="en-GB"/>
           </a:p>
@@ -1240,7 +1242,7 @@
           <a:p>
             <a:fld id="{019A4621-3A5A-461F-B391-01560BCA82BB}" type="datetimeFigureOut">
               <a:rPr lang="en-GB" smtClean="0"/>
-              <a:t>19/04/2019</a:t>
+              <a:t>21/04/2019</a:t>
             </a:fld>
             <a:endParaRPr lang="en-GB"/>
           </a:p>
@@ -1607,7 +1609,7 @@
           <a:p>
             <a:fld id="{019A4621-3A5A-461F-B391-01560BCA82BB}" type="datetimeFigureOut">
               <a:rPr lang="en-GB" smtClean="0"/>
-              <a:t>19/04/2019</a:t>
+              <a:t>21/04/2019</a:t>
             </a:fld>
             <a:endParaRPr lang="en-GB"/>
           </a:p>
@@ -1725,7 +1727,7 @@
           <a:p>
             <a:fld id="{019A4621-3A5A-461F-B391-01560BCA82BB}" type="datetimeFigureOut">
               <a:rPr lang="en-GB" smtClean="0"/>
-              <a:t>19/04/2019</a:t>
+              <a:t>21/04/2019</a:t>
             </a:fld>
             <a:endParaRPr lang="en-GB"/>
           </a:p>
@@ -1820,7 +1822,7 @@
           <a:p>
             <a:fld id="{019A4621-3A5A-461F-B391-01560BCA82BB}" type="datetimeFigureOut">
               <a:rPr lang="en-GB" smtClean="0"/>
-              <a:t>19/04/2019</a:t>
+              <a:t>21/04/2019</a:t>
             </a:fld>
             <a:endParaRPr lang="en-GB"/>
           </a:p>
@@ -2097,7 +2099,7 @@
           <a:p>
             <a:fld id="{019A4621-3A5A-461F-B391-01560BCA82BB}" type="datetimeFigureOut">
               <a:rPr lang="en-GB" smtClean="0"/>
-              <a:t>19/04/2019</a:t>
+              <a:t>21/04/2019</a:t>
             </a:fld>
             <a:endParaRPr lang="en-GB"/>
           </a:p>
@@ -2354,7 +2356,7 @@
           <a:p>
             <a:fld id="{019A4621-3A5A-461F-B391-01560BCA82BB}" type="datetimeFigureOut">
               <a:rPr lang="en-GB" smtClean="0"/>
-              <a:t>19/04/2019</a:t>
+              <a:t>21/04/2019</a:t>
             </a:fld>
             <a:endParaRPr lang="en-GB"/>
           </a:p>
@@ -2567,7 +2569,7 @@
           <a:p>
             <a:fld id="{019A4621-3A5A-461F-B391-01560BCA82BB}" type="datetimeFigureOut">
               <a:rPr lang="en-GB" smtClean="0"/>
-              <a:t>19/04/2019</a:t>
+              <a:t>21/04/2019</a:t>
             </a:fld>
             <a:endParaRPr lang="en-GB"/>
           </a:p>
@@ -3150,6 +3152,386 @@
       </p:grpSpPr>
       <p:grpSp>
         <p:nvGrpSpPr>
+          <p:cNvPr id="13" name="Group 12">
+            <a:extLst>
+              <a:ext uri="{FF2B5EF4-FFF2-40B4-BE49-F238E27FC236}">
+                <a16:creationId xmlns:a16="http://schemas.microsoft.com/office/drawing/2014/main" id="{190F87E8-1FC0-41A4-8DAF-5EB00A66E2C4}"/>
+              </a:ext>
+            </a:extLst>
+          </p:cNvPr>
+          <p:cNvGrpSpPr/>
+          <p:nvPr/>
+        </p:nvGrpSpPr>
+        <p:grpSpPr>
+          <a:xfrm>
+            <a:off x="-25608" y="0"/>
+            <a:ext cx="5512008" cy="7315200"/>
+            <a:chOff x="-25608" y="0"/>
+            <a:chExt cx="5512008" cy="7315200"/>
+          </a:xfrm>
+        </p:grpSpPr>
+        <p:grpSp>
+          <p:nvGrpSpPr>
+            <p:cNvPr id="8" name="Group 7">
+              <a:extLst>
+                <a:ext uri="{FF2B5EF4-FFF2-40B4-BE49-F238E27FC236}">
+                  <a16:creationId xmlns:a16="http://schemas.microsoft.com/office/drawing/2014/main" id="{119DF78B-44C9-4635-AD8F-DB83F9442068}"/>
+                </a:ext>
+              </a:extLst>
+            </p:cNvPr>
+            <p:cNvGrpSpPr/>
+            <p:nvPr/>
+          </p:nvGrpSpPr>
+          <p:grpSpPr>
+            <a:xfrm>
+              <a:off x="-25608" y="0"/>
+              <a:ext cx="5486400" cy="7315200"/>
+              <a:chOff x="0" y="0"/>
+              <a:chExt cx="5486400" cy="7315200"/>
+            </a:xfrm>
+          </p:grpSpPr>
+          <p:pic>
+            <p:nvPicPr>
+              <p:cNvPr id="3" name="Picture 2">
+                <a:extLst>
+                  <a:ext uri="{FF2B5EF4-FFF2-40B4-BE49-F238E27FC236}">
+                    <a16:creationId xmlns:a16="http://schemas.microsoft.com/office/drawing/2014/main" id="{40A169AF-7369-4C7E-9B3B-D844A8D34F23}"/>
+                  </a:ext>
+                </a:extLst>
+              </p:cNvPr>
+              <p:cNvPicPr>
+                <a:picLocks noChangeAspect="1"/>
+              </p:cNvPicPr>
+              <p:nvPr/>
+            </p:nvPicPr>
+            <p:blipFill rotWithShape="1">
+              <a:blip r:embed="rId2">
+                <a:extLst>
+                  <a:ext uri="{28A0092B-C50C-407E-A947-70E740481C1C}">
+                    <a14:useLocalDpi xmlns:a14="http://schemas.microsoft.com/office/drawing/2010/main" val="0"/>
+                  </a:ext>
+                </a:extLst>
+              </a:blip>
+              <a:srcRect t="50000"/>
+              <a:stretch/>
+            </p:blipFill>
+            <p:spPr>
+              <a:xfrm>
+                <a:off x="0" y="0"/>
+                <a:ext cx="5486400" cy="7315200"/>
+              </a:xfrm>
+              <a:prstGeom prst="rect">
+                <a:avLst/>
+              </a:prstGeom>
+            </p:spPr>
+          </p:pic>
+          <p:sp>
+            <p:nvSpPr>
+              <p:cNvPr id="6" name="TextBox 5">
+                <a:extLst>
+                  <a:ext uri="{FF2B5EF4-FFF2-40B4-BE49-F238E27FC236}">
+                    <a16:creationId xmlns:a16="http://schemas.microsoft.com/office/drawing/2014/main" id="{041567F3-957D-4BB5-A8D8-F8F27470C1AE}"/>
+                  </a:ext>
+                </a:extLst>
+              </p:cNvPr>
+              <p:cNvSpPr txBox="1"/>
+              <p:nvPr/>
+            </p:nvSpPr>
+            <p:spPr>
+              <a:xfrm>
+                <a:off x="67236" y="107576"/>
+                <a:ext cx="5351928" cy="2862322"/>
+              </a:xfrm>
+              <a:prstGeom prst="rect">
+                <a:avLst/>
+              </a:prstGeom>
+              <a:noFill/>
+            </p:spPr>
+            <p:txBody>
+              <a:bodyPr wrap="square" rtlCol="0">
+                <a:spAutoFit/>
+              </a:bodyPr>
+              <a:lstStyle/>
+              <a:p>
+                <a:r>
+                  <a:rPr lang="en-US" dirty="0">
+                    <a:solidFill>
+                      <a:schemeClr val="bg1"/>
+                    </a:solidFill>
+                  </a:rPr>
+                  <a:t>Welcome to CV Shooter.</a:t>
+                </a:r>
+              </a:p>
+              <a:p>
+                <a:r>
+                  <a:rPr lang="en-US" dirty="0">
+                    <a:solidFill>
+                      <a:schemeClr val="bg1"/>
+                    </a:solidFill>
+                  </a:rPr>
+                  <a:t>This is a space shooter game controlled by </a:t>
+                </a:r>
+                <a:r>
+                  <a:rPr lang="en-US" dirty="0" err="1">
+                    <a:solidFill>
+                      <a:schemeClr val="bg1"/>
+                    </a:solidFill>
+                  </a:rPr>
+                  <a:t>opencv</a:t>
+                </a:r>
+                <a:r>
+                  <a:rPr lang="en-US" dirty="0">
+                    <a:solidFill>
+                      <a:schemeClr val="bg1"/>
+                    </a:solidFill>
+                  </a:rPr>
+                  <a:t> color detection. You need a red object to play this game.</a:t>
+                </a:r>
+              </a:p>
+              <a:p>
+                <a:r>
+                  <a:rPr lang="en-GB" dirty="0">
+                    <a:solidFill>
+                      <a:schemeClr val="bg1"/>
+                    </a:solidFill>
+                  </a:rPr>
+                  <a:t>On your right, there should be a webcam view with lines dividing the entire screen.</a:t>
+                </a:r>
+              </a:p>
+              <a:p>
+                <a:r>
+                  <a:rPr lang="en-GB" dirty="0">
+                    <a:solidFill>
+                      <a:schemeClr val="bg1"/>
+                    </a:solidFill>
+                  </a:rPr>
+                  <a:t>The ship can move 8 different directions based on where the red </a:t>
+                </a:r>
+                <a:r>
+                  <a:rPr lang="en-US" dirty="0">
+                    <a:solidFill>
+                      <a:schemeClr val="bg1"/>
+                    </a:solidFill>
+                  </a:rPr>
+                  <a:t>color</a:t>
+                </a:r>
+                <a:r>
+                  <a:rPr lang="en-GB" dirty="0">
+                    <a:solidFill>
+                      <a:schemeClr val="bg1"/>
+                    </a:solidFill>
+                  </a:rPr>
+                  <a:t> is detected.</a:t>
+                </a:r>
+              </a:p>
+              <a:p>
+                <a:r>
+                  <a:rPr lang="en-GB" dirty="0">
+                    <a:solidFill>
+                      <a:schemeClr val="bg1"/>
+                    </a:solidFill>
+                  </a:rPr>
+                  <a:t>Try moving the ship!</a:t>
+                </a:r>
+              </a:p>
+              <a:p>
+                <a:endParaRPr lang="en-GB" dirty="0">
+                  <a:solidFill>
+                    <a:schemeClr val="bg1"/>
+                  </a:solidFill>
+                </a:endParaRPr>
+              </a:p>
+              <a:p>
+                <a:r>
+                  <a:rPr lang="en-GB" b="1" dirty="0">
+                    <a:solidFill>
+                      <a:schemeClr val="bg1"/>
+                    </a:solidFill>
+                  </a:rPr>
+                  <a:t>Press Q to quit to main menu</a:t>
+                </a:r>
+                <a:endParaRPr lang="en-US" b="1" dirty="0">
+                  <a:solidFill>
+                    <a:schemeClr val="bg1"/>
+                  </a:solidFill>
+                </a:endParaRPr>
+              </a:p>
+            </p:txBody>
+          </p:sp>
+        </p:grpSp>
+        <p:sp>
+          <p:nvSpPr>
+            <p:cNvPr id="12" name="Rectangle 11">
+              <a:extLst>
+                <a:ext uri="{FF2B5EF4-FFF2-40B4-BE49-F238E27FC236}">
+                  <a16:creationId xmlns:a16="http://schemas.microsoft.com/office/drawing/2014/main" id="{3B6DBD95-8E14-49D3-96E9-E246B727724E}"/>
+                </a:ext>
+              </a:extLst>
+            </p:cNvPr>
+            <p:cNvSpPr/>
+            <p:nvPr/>
+          </p:nvSpPr>
+          <p:spPr>
+            <a:xfrm>
+              <a:off x="1295401" y="4356847"/>
+              <a:ext cx="4098155" cy="1111624"/>
+            </a:xfrm>
+            <a:prstGeom prst="rect">
+              <a:avLst/>
+            </a:prstGeom>
+            <a:solidFill>
+              <a:srgbClr val="00B050"/>
+            </a:solidFill>
+          </p:spPr>
+          <p:style>
+            <a:lnRef idx="2">
+              <a:schemeClr val="accent6">
+                <a:shade val="50000"/>
+              </a:schemeClr>
+            </a:lnRef>
+            <a:fillRef idx="1">
+              <a:schemeClr val="accent6"/>
+            </a:fillRef>
+            <a:effectRef idx="0">
+              <a:schemeClr val="accent6"/>
+            </a:effectRef>
+            <a:fontRef idx="minor">
+              <a:schemeClr val="lt1"/>
+            </a:fontRef>
+          </p:style>
+          <p:txBody>
+            <a:bodyPr rtlCol="0" anchor="ctr"/>
+            <a:lstStyle/>
+            <a:p>
+              <a:pPr algn="ctr"/>
+              <a:endParaRPr lang="en-GB">
+                <a:solidFill>
+                  <a:srgbClr val="00B050"/>
+                </a:solidFill>
+              </a:endParaRPr>
+            </a:p>
+          </p:txBody>
+        </p:sp>
+        <p:sp>
+          <p:nvSpPr>
+            <p:cNvPr id="5" name="TextBox 4">
+              <a:extLst>
+                <a:ext uri="{FF2B5EF4-FFF2-40B4-BE49-F238E27FC236}">
+                  <a16:creationId xmlns:a16="http://schemas.microsoft.com/office/drawing/2014/main" id="{2EABCD12-D772-4C6B-9272-FD38159DC80C}"/>
+                </a:ext>
+              </a:extLst>
+            </p:cNvPr>
+            <p:cNvSpPr txBox="1"/>
+            <p:nvPr/>
+          </p:nvSpPr>
+          <p:spPr>
+            <a:xfrm>
+              <a:off x="1295401" y="4560767"/>
+              <a:ext cx="4190999" cy="738664"/>
+            </a:xfrm>
+            <a:prstGeom prst="rect">
+              <a:avLst/>
+            </a:prstGeom>
+            <a:noFill/>
+          </p:spPr>
+          <p:txBody>
+            <a:bodyPr wrap="square" rtlCol="0">
+              <a:spAutoFit/>
+            </a:bodyPr>
+            <a:lstStyle/>
+            <a:p>
+              <a:pPr algn="ctr"/>
+              <a:r>
+                <a:rPr lang="en-US" sz="1400" b="1" dirty="0">
+                  <a:solidFill>
+                    <a:srgbClr val="FF0000"/>
+                  </a:solidFill>
+                </a:rPr>
+                <a:t>A group of alien spaceships are trying to invade Earth.</a:t>
+              </a:r>
+            </a:p>
+            <a:p>
+              <a:pPr algn="ctr"/>
+              <a:r>
+                <a:rPr lang="en-US" sz="1400" b="1" dirty="0">
+                  <a:solidFill>
+                    <a:srgbClr val="FF0000"/>
+                  </a:solidFill>
+                </a:rPr>
+                <a:t>It is up to you, the pilot of the only spaceship left on Earth to drive away those invaders. Good luck!</a:t>
+              </a:r>
+            </a:p>
+          </p:txBody>
+        </p:sp>
+        <p:pic>
+          <p:nvPicPr>
+            <p:cNvPr id="11" name="Picture 10">
+              <a:extLst>
+                <a:ext uri="{FF2B5EF4-FFF2-40B4-BE49-F238E27FC236}">
+                  <a16:creationId xmlns:a16="http://schemas.microsoft.com/office/drawing/2014/main" id="{23D693BD-D64F-49DC-9B93-B230EA26B4B4}"/>
+                </a:ext>
+              </a:extLst>
+            </p:cNvPr>
+            <p:cNvPicPr>
+              <a:picLocks noChangeAspect="1"/>
+            </p:cNvPicPr>
+            <p:nvPr/>
+          </p:nvPicPr>
+          <p:blipFill>
+            <a:blip r:embed="rId3">
+              <a:extLst>
+                <a:ext uri="{28A0092B-C50C-407E-A947-70E740481C1C}">
+                  <a14:useLocalDpi xmlns:a14="http://schemas.microsoft.com/office/drawing/2010/main" val="0"/>
+                </a:ext>
+              </a:extLst>
+            </a:blip>
+            <a:stretch>
+              <a:fillRect/>
+            </a:stretch>
+          </p:blipFill>
+          <p:spPr>
+            <a:xfrm>
+              <a:off x="117350" y="4257538"/>
+              <a:ext cx="1035094" cy="1345122"/>
+            </a:xfrm>
+            <a:prstGeom prst="rect">
+              <a:avLst/>
+            </a:prstGeom>
+          </p:spPr>
+        </p:pic>
+      </p:grpSp>
+    </p:spTree>
+    <p:extLst>
+      <p:ext uri="{BB962C8B-B14F-4D97-AF65-F5344CB8AC3E}">
+        <p14:creationId xmlns:p14="http://schemas.microsoft.com/office/powerpoint/2010/main" val="3607927594"/>
+      </p:ext>
+    </p:extLst>
+  </p:cSld>
+  <p:clrMapOvr>
+    <a:masterClrMapping/>
+  </p:clrMapOvr>
+</p:sld>
+</file>
+
+<file path=ppt/slides/slide3.xml><?xml version="1.0" encoding="utf-8"?>
+<p:sld xmlns:a="http://schemas.openxmlformats.org/drawingml/2006/main" xmlns:r="http://schemas.openxmlformats.org/officeDocument/2006/relationships" xmlns:p="http://schemas.openxmlformats.org/presentationml/2006/main">
+  <p:cSld>
+    <p:spTree>
+      <p:nvGrpSpPr>
+        <p:cNvPr id="1" name=""/>
+        <p:cNvGrpSpPr/>
+        <p:nvPr/>
+      </p:nvGrpSpPr>
+      <p:grpSpPr>
+        <a:xfrm>
+          <a:off x="0" y="0"/>
+          <a:ext cx="0" cy="0"/>
+          <a:chOff x="0" y="0"/>
+          <a:chExt cx="0" cy="0"/>
+        </a:xfrm>
+      </p:grpSpPr>
+      <p:grpSp>
+        <p:nvGrpSpPr>
           <p:cNvPr id="8" name="Group 7">
             <a:extLst>
               <a:ext uri="{FF2B5EF4-FFF2-40B4-BE49-F238E27FC236}">
@@ -3217,8 +3599,8 @@
           </p:nvSpPr>
           <p:spPr>
             <a:xfrm>
-              <a:off x="67236" y="421341"/>
-              <a:ext cx="5351928" cy="2862322"/>
+              <a:off x="134472" y="3334434"/>
+              <a:ext cx="5351928" cy="646331"/>
             </a:xfrm>
             <a:prstGeom prst="rect">
               <a:avLst/>
@@ -3231,108 +3613,15 @@
             </a:bodyPr>
             <a:lstStyle/>
             <a:p>
+              <a:pPr algn="ctr"/>
               <a:r>
-                <a:rPr lang="en-US" dirty="0">
+                <a:rPr lang="en-US" b="1" dirty="0">
                   <a:solidFill>
-                    <a:schemeClr val="bg1"/>
+                    <a:srgbClr val="00B050"/>
                   </a:solidFill>
                 </a:rPr>
-                <a:t>Welcome to CV Shooter.</a:t>
+                <a:t>Congratulations! You have defeated the alien spaceships trying to invade Earth!</a:t>
               </a:r>
-            </a:p>
-            <a:p>
-              <a:r>
-                <a:rPr lang="en-US" dirty="0">
-                  <a:solidFill>
-                    <a:schemeClr val="bg1"/>
-                  </a:solidFill>
-                </a:rPr>
-                <a:t>This is a space shooter game controlled by </a:t>
-              </a:r>
-              <a:r>
-                <a:rPr lang="en-US" dirty="0" err="1">
-                  <a:solidFill>
-                    <a:schemeClr val="bg1"/>
-                  </a:solidFill>
-                </a:rPr>
-                <a:t>opencv</a:t>
-              </a:r>
-              <a:r>
-                <a:rPr lang="en-US" dirty="0">
-                  <a:solidFill>
-                    <a:schemeClr val="bg1"/>
-                  </a:solidFill>
-                </a:rPr>
-                <a:t> color detection. You need a red object to play this game.</a:t>
-              </a:r>
-            </a:p>
-            <a:p>
-              <a:r>
-                <a:rPr lang="en-GB" dirty="0">
-                  <a:solidFill>
-                    <a:schemeClr val="bg1"/>
-                  </a:solidFill>
-                </a:rPr>
-                <a:t>On your right, there should be a webcam view with lines dividing the entire screen.</a:t>
-              </a:r>
-            </a:p>
-            <a:p>
-              <a:r>
-                <a:rPr lang="en-GB" dirty="0">
-                  <a:solidFill>
-                    <a:schemeClr val="bg1"/>
-                  </a:solidFill>
-                </a:rPr>
-                <a:t>The ship can move 8 different directions based on where the red </a:t>
-              </a:r>
-              <a:r>
-                <a:rPr lang="en-US" dirty="0">
-                  <a:solidFill>
-                    <a:schemeClr val="bg1"/>
-                  </a:solidFill>
-                </a:rPr>
-                <a:t>color</a:t>
-              </a:r>
-              <a:r>
-                <a:rPr lang="en-GB" dirty="0">
-                  <a:solidFill>
-                    <a:schemeClr val="bg1"/>
-                  </a:solidFill>
-                </a:rPr>
-                <a:t> is detected.</a:t>
-              </a:r>
-            </a:p>
-            <a:p>
-              <a:r>
-                <a:rPr lang="en-GB" dirty="0">
-                  <a:solidFill>
-                    <a:schemeClr val="bg1"/>
-                  </a:solidFill>
-                </a:rPr>
-                <a:t>Try moving the ship!</a:t>
-              </a:r>
-            </a:p>
-            <a:p>
-              <a:endParaRPr lang="en-GB" dirty="0">
-                <a:solidFill>
-                  <a:schemeClr val="bg1"/>
-                </a:solidFill>
-              </a:endParaRPr>
-            </a:p>
-            <a:p>
-              <a:r>
-                <a:rPr lang="en-GB" b="1" dirty="0">
-                  <a:solidFill>
-                    <a:schemeClr val="bg1"/>
-                  </a:solidFill>
-                </a:rPr>
-                <a:t>Press Q to quit to main menu</a:t>
-              </a:r>
-              <a:endParaRPr lang="en-US" b="1" dirty="0">
-                <a:solidFill>
-                  <a:schemeClr val="bg1"/>
-                </a:solidFill>
-              </a:endParaRPr>
             </a:p>
           </p:txBody>
         </p:sp>
@@ -3340,7 +3629,155 @@
     </p:spTree>
     <p:extLst>
       <p:ext uri="{BB962C8B-B14F-4D97-AF65-F5344CB8AC3E}">
-        <p14:creationId xmlns:p14="http://schemas.microsoft.com/office/powerpoint/2010/main" val="3607927594"/>
+        <p14:creationId xmlns:p14="http://schemas.microsoft.com/office/powerpoint/2010/main" val="3007395495"/>
+      </p:ext>
+    </p:extLst>
+  </p:cSld>
+  <p:clrMapOvr>
+    <a:masterClrMapping/>
+  </p:clrMapOvr>
+</p:sld>
+</file>
+
+<file path=ppt/slides/slide4.xml><?xml version="1.0" encoding="utf-8"?>
+<p:sld xmlns:a="http://schemas.openxmlformats.org/drawingml/2006/main" xmlns:r="http://schemas.openxmlformats.org/officeDocument/2006/relationships" xmlns:p="http://schemas.openxmlformats.org/presentationml/2006/main">
+  <p:cSld>
+    <p:spTree>
+      <p:nvGrpSpPr>
+        <p:cNvPr id="1" name=""/>
+        <p:cNvGrpSpPr/>
+        <p:nvPr/>
+      </p:nvGrpSpPr>
+      <p:grpSpPr>
+        <a:xfrm>
+          <a:off x="0" y="0"/>
+          <a:ext cx="0" cy="0"/>
+          <a:chOff x="0" y="0"/>
+          <a:chExt cx="0" cy="0"/>
+        </a:xfrm>
+      </p:grpSpPr>
+      <p:grpSp>
+        <p:nvGrpSpPr>
+          <p:cNvPr id="7" name="Group 6">
+            <a:extLst>
+              <a:ext uri="{FF2B5EF4-FFF2-40B4-BE49-F238E27FC236}">
+                <a16:creationId xmlns:a16="http://schemas.microsoft.com/office/drawing/2014/main" id="{7093E0E9-FD05-455A-959A-29733235FD15}"/>
+              </a:ext>
+            </a:extLst>
+          </p:cNvPr>
+          <p:cNvGrpSpPr/>
+          <p:nvPr/>
+        </p:nvGrpSpPr>
+        <p:grpSpPr>
+          <a:xfrm>
+            <a:off x="0" y="0"/>
+            <a:ext cx="5486400" cy="7315200"/>
+            <a:chOff x="0" y="0"/>
+            <a:chExt cx="5486400" cy="7315200"/>
+          </a:xfrm>
+        </p:grpSpPr>
+        <p:pic>
+          <p:nvPicPr>
+            <p:cNvPr id="8" name="Picture 7">
+              <a:extLst>
+                <a:ext uri="{FF2B5EF4-FFF2-40B4-BE49-F238E27FC236}">
+                  <a16:creationId xmlns:a16="http://schemas.microsoft.com/office/drawing/2014/main" id="{2A5A1F5E-18D0-4977-A3E8-24F9026F061B}"/>
+                </a:ext>
+              </a:extLst>
+            </p:cNvPr>
+            <p:cNvPicPr>
+              <a:picLocks noChangeAspect="1"/>
+            </p:cNvPicPr>
+            <p:nvPr/>
+          </p:nvPicPr>
+          <p:blipFill rotWithShape="1">
+            <a:blip r:embed="rId2">
+              <a:extLst>
+                <a:ext uri="{28A0092B-C50C-407E-A947-70E740481C1C}">
+                  <a14:useLocalDpi xmlns:a14="http://schemas.microsoft.com/office/drawing/2010/main" val="0"/>
+                </a:ext>
+              </a:extLst>
+            </a:blip>
+            <a:srcRect t="50000"/>
+            <a:stretch/>
+          </p:blipFill>
+          <p:spPr>
+            <a:xfrm>
+              <a:off x="0" y="0"/>
+              <a:ext cx="5486400" cy="7315200"/>
+            </a:xfrm>
+            <a:prstGeom prst="rect">
+              <a:avLst/>
+            </a:prstGeom>
+          </p:spPr>
+        </p:pic>
+        <p:sp>
+          <p:nvSpPr>
+            <p:cNvPr id="9" name="TextBox 8">
+              <a:extLst>
+                <a:ext uri="{FF2B5EF4-FFF2-40B4-BE49-F238E27FC236}">
+                  <a16:creationId xmlns:a16="http://schemas.microsoft.com/office/drawing/2014/main" id="{15705C1D-9823-44BC-8ED3-911FDBA1D3F2}"/>
+                </a:ext>
+              </a:extLst>
+            </p:cNvPr>
+            <p:cNvSpPr txBox="1"/>
+            <p:nvPr/>
+          </p:nvSpPr>
+          <p:spPr>
+            <a:xfrm>
+              <a:off x="134472" y="2833317"/>
+              <a:ext cx="5351928" cy="1200329"/>
+            </a:xfrm>
+            <a:prstGeom prst="rect">
+              <a:avLst/>
+            </a:prstGeom>
+            <a:noFill/>
+          </p:spPr>
+          <p:txBody>
+            <a:bodyPr wrap="square" rtlCol="0">
+              <a:spAutoFit/>
+            </a:bodyPr>
+            <a:lstStyle/>
+            <a:p>
+              <a:pPr algn="ctr"/>
+              <a:r>
+                <a:rPr lang="en-US" b="1" dirty="0">
+                  <a:solidFill>
+                    <a:srgbClr val="FF0000"/>
+                  </a:solidFill>
+                </a:rPr>
+                <a:t>The last hope for humanity has been destroyed.</a:t>
+              </a:r>
+            </a:p>
+            <a:p>
+              <a:pPr algn="ctr"/>
+              <a:r>
+                <a:rPr lang="en-US" b="1" dirty="0">
+                  <a:solidFill>
+                    <a:srgbClr val="FF0000"/>
+                  </a:solidFill>
+                </a:rPr>
+                <a:t>The aliens took over the planet.</a:t>
+              </a:r>
+            </a:p>
+            <a:p>
+              <a:pPr algn="ctr"/>
+              <a:r>
+                <a:rPr lang="en-US" b="1" dirty="0">
+                  <a:solidFill>
+                    <a:srgbClr val="FF0000"/>
+                  </a:solidFill>
+                </a:rPr>
+                <a:t>Humanity are forced to leave their home planet and voyage in endless darkness…</a:t>
+              </a:r>
+            </a:p>
+          </p:txBody>
+        </p:sp>
+      </p:grpSp>
+    </p:spTree>
+    <p:extLst>
+      <p:ext uri="{BB962C8B-B14F-4D97-AF65-F5344CB8AC3E}">
+        <p14:creationId xmlns:p14="http://schemas.microsoft.com/office/powerpoint/2010/main" val="3154313080"/>
       </p:ext>
     </p:extLst>
   </p:cSld>

</xml_diff>